<commit_message>
FindTheOdd, Story, Questions listos. Determinar peso sin tutorial
</commit_message>
<xml_diff>
--- a/other/workplace.pptx
+++ b/other/workplace.pptx
@@ -107,6 +107,11 @@
       </a:defRPr>
     </a:lvl9pPr>
   </p:defaultTextStyle>
+  <p:extLst>
+    <p:ext uri="{EFAFB233-063F-42B5-8137-9DF3F51BA10A}">
+      <p15:sldGuideLst xmlns:p15="http://schemas.microsoft.com/office/powerpoint/2012/main"/>
+    </p:ext>
+  </p:extLst>
 </p:presentation>
 </file>
 
@@ -241,7 +246,7 @@
           <a:p>
             <a:fld id="{5DDFAB5F-594E-4210-B879-61D5946785BE}" type="datetimeFigureOut">
               <a:rPr lang="es-CL" smtClean="0"/>
-              <a:t>19-05-2016</a:t>
+              <a:t>25-05-2016</a:t>
             </a:fld>
             <a:endParaRPr lang="es-CL"/>
           </a:p>
@@ -411,7 +416,7 @@
           <a:p>
             <a:fld id="{5DDFAB5F-594E-4210-B879-61D5946785BE}" type="datetimeFigureOut">
               <a:rPr lang="es-CL" smtClean="0"/>
-              <a:t>19-05-2016</a:t>
+              <a:t>25-05-2016</a:t>
             </a:fld>
             <a:endParaRPr lang="es-CL"/>
           </a:p>
@@ -591,7 +596,7 @@
           <a:p>
             <a:fld id="{5DDFAB5F-594E-4210-B879-61D5946785BE}" type="datetimeFigureOut">
               <a:rPr lang="es-CL" smtClean="0"/>
-              <a:t>19-05-2016</a:t>
+              <a:t>25-05-2016</a:t>
             </a:fld>
             <a:endParaRPr lang="es-CL"/>
           </a:p>
@@ -761,7 +766,7 @@
           <a:p>
             <a:fld id="{5DDFAB5F-594E-4210-B879-61D5946785BE}" type="datetimeFigureOut">
               <a:rPr lang="es-CL" smtClean="0"/>
-              <a:t>19-05-2016</a:t>
+              <a:t>25-05-2016</a:t>
             </a:fld>
             <a:endParaRPr lang="es-CL"/>
           </a:p>
@@ -1007,7 +1012,7 @@
           <a:p>
             <a:fld id="{5DDFAB5F-594E-4210-B879-61D5946785BE}" type="datetimeFigureOut">
               <a:rPr lang="es-CL" smtClean="0"/>
-              <a:t>19-05-2016</a:t>
+              <a:t>25-05-2016</a:t>
             </a:fld>
             <a:endParaRPr lang="es-CL"/>
           </a:p>
@@ -1239,7 +1244,7 @@
           <a:p>
             <a:fld id="{5DDFAB5F-594E-4210-B879-61D5946785BE}" type="datetimeFigureOut">
               <a:rPr lang="es-CL" smtClean="0"/>
-              <a:t>19-05-2016</a:t>
+              <a:t>25-05-2016</a:t>
             </a:fld>
             <a:endParaRPr lang="es-CL"/>
           </a:p>
@@ -1606,7 +1611,7 @@
           <a:p>
             <a:fld id="{5DDFAB5F-594E-4210-B879-61D5946785BE}" type="datetimeFigureOut">
               <a:rPr lang="es-CL" smtClean="0"/>
-              <a:t>19-05-2016</a:t>
+              <a:t>25-05-2016</a:t>
             </a:fld>
             <a:endParaRPr lang="es-CL"/>
           </a:p>
@@ -1724,7 +1729,7 @@
           <a:p>
             <a:fld id="{5DDFAB5F-594E-4210-B879-61D5946785BE}" type="datetimeFigureOut">
               <a:rPr lang="es-CL" smtClean="0"/>
-              <a:t>19-05-2016</a:t>
+              <a:t>25-05-2016</a:t>
             </a:fld>
             <a:endParaRPr lang="es-CL"/>
           </a:p>
@@ -1819,7 +1824,7 @@
           <a:p>
             <a:fld id="{5DDFAB5F-594E-4210-B879-61D5946785BE}" type="datetimeFigureOut">
               <a:rPr lang="es-CL" smtClean="0"/>
-              <a:t>19-05-2016</a:t>
+              <a:t>25-05-2016</a:t>
             </a:fld>
             <a:endParaRPr lang="es-CL"/>
           </a:p>
@@ -2096,7 +2101,7 @@
           <a:p>
             <a:fld id="{5DDFAB5F-594E-4210-B879-61D5946785BE}" type="datetimeFigureOut">
               <a:rPr lang="es-CL" smtClean="0"/>
-              <a:t>19-05-2016</a:t>
+              <a:t>25-05-2016</a:t>
             </a:fld>
             <a:endParaRPr lang="es-CL"/>
           </a:p>
@@ -2349,7 +2354,7 @@
           <a:p>
             <a:fld id="{5DDFAB5F-594E-4210-B879-61D5946785BE}" type="datetimeFigureOut">
               <a:rPr lang="es-CL" smtClean="0"/>
-              <a:t>19-05-2016</a:t>
+              <a:t>25-05-2016</a:t>
             </a:fld>
             <a:endParaRPr lang="es-CL"/>
           </a:p>
@@ -2562,7 +2567,7 @@
           <a:p>
             <a:fld id="{5DDFAB5F-594E-4210-B879-61D5946785BE}" type="datetimeFigureOut">
               <a:rPr lang="es-CL" smtClean="0"/>
-              <a:t>19-05-2016</a:t>
+              <a:t>25-05-2016</a:t>
             </a:fld>
             <a:endParaRPr lang="es-CL"/>
           </a:p>
@@ -2997,7 +3002,7 @@
         </p:blipFill>
         <p:spPr>
           <a:xfrm>
-            <a:off x="4839031" y="2559153"/>
+            <a:off x="105517" y="1236986"/>
             <a:ext cx="4883575" cy="3662681"/>
           </a:xfrm>
           <a:prstGeom prst="rect">
@@ -3317,7 +3322,7 @@
         </p:blipFill>
         <p:spPr>
           <a:xfrm>
-            <a:off x="3195705" y="1805948"/>
+            <a:off x="5833661" y="4060284"/>
             <a:ext cx="4866091" cy="2443480"/>
           </a:xfrm>
           <a:prstGeom prst="rect">
@@ -3817,7 +3822,7 @@
         </p:blipFill>
         <p:spPr>
           <a:xfrm>
-            <a:off x="3412508" y="585732"/>
+            <a:off x="836579" y="2383886"/>
             <a:ext cx="4882896" cy="3663696"/>
           </a:xfrm>
           <a:prstGeom prst="rect">

</xml_diff>